<commit_message>
added javadoc, changed to IT, surefire report
</commit_message>
<xml_diff>
--- a/IMS Presentation.pptx
+++ b/IMS Presentation.pptx
@@ -5165,8 +5165,8 @@
     <dgm:cxn modelId="{8FC0C259-7B4F-4C7D-AFA8-A88819873F9D}" srcId="{B514D29A-16F0-4A5D-A019-AB7B76DA3E8D}" destId="{A74509D4-8A9A-4B94-B4DF-AB1508EFA158}" srcOrd="0" destOrd="0" parTransId="{62A6774B-177B-440A-B37B-ADD1B9E0F5D5}" sibTransId="{7611B6AA-3312-4116-9B9A-789E7FD99192}"/>
     <dgm:cxn modelId="{1CF04907-2B6C-4922-B10F-930A036A3F23}" type="presOf" srcId="{A74509D4-8A9A-4B94-B4DF-AB1508EFA158}" destId="{A196E09F-44DB-4F98-9C90-250514A53194}" srcOrd="0" destOrd="0" presId="urn:microsoft.com/office/officeart/2005/8/layout/vList2"/>
     <dgm:cxn modelId="{182E46FF-98A8-4389-9187-061B485BA7EA}" type="presOf" srcId="{B514D29A-16F0-4A5D-A019-AB7B76DA3E8D}" destId="{BAE2319A-488B-4FEB-B2A3-AF29DD0979B8}" srcOrd="0" destOrd="0" presId="urn:microsoft.com/office/officeart/2005/8/layout/vList2"/>
+    <dgm:cxn modelId="{6D10F492-F145-4783-A7A0-2916D75B258A}" srcId="{A74509D4-8A9A-4B94-B4DF-AB1508EFA158}" destId="{FE506BD3-F412-4320-BB15-F083177B08C4}" srcOrd="1" destOrd="0" parTransId="{1A539764-C144-4527-BD36-2B89624183B1}" sibTransId="{8A224BD7-7123-44A0-90A9-D6148EE3D6CD}"/>
     <dgm:cxn modelId="{19A68305-CDDD-42A3-8D18-FB60311CA69D}" srcId="{A74509D4-8A9A-4B94-B4DF-AB1508EFA158}" destId="{EF6F41E1-67B2-4AFF-9AA3-9DEF86E2FEC1}" srcOrd="4" destOrd="0" parTransId="{55BF700A-8934-4A6B-84FD-4A6D08EF5ABE}" sibTransId="{B9271546-DDD0-4E45-8611-338F45192B92}"/>
-    <dgm:cxn modelId="{6D10F492-F145-4783-A7A0-2916D75B258A}" srcId="{A74509D4-8A9A-4B94-B4DF-AB1508EFA158}" destId="{FE506BD3-F412-4320-BB15-F083177B08C4}" srcOrd="1" destOrd="0" parTransId="{1A539764-C144-4527-BD36-2B89624183B1}" sibTransId="{8A224BD7-7123-44A0-90A9-D6148EE3D6CD}"/>
     <dgm:cxn modelId="{2DDC96BE-B6B7-4A08-B254-E6E23289D72F}" type="presParOf" srcId="{BAE2319A-488B-4FEB-B2A3-AF29DD0979B8}" destId="{A196E09F-44DB-4F98-9C90-250514A53194}" srcOrd="0" destOrd="0" presId="urn:microsoft.com/office/officeart/2005/8/layout/vList2"/>
     <dgm:cxn modelId="{FAF863A1-D9BA-4075-B3D5-61A118306FD0}" type="presParOf" srcId="{BAE2319A-488B-4FEB-B2A3-AF29DD0979B8}" destId="{95B16FA1-C471-443D-9B18-21235878FDAA}" srcOrd="1" destOrd="0" presId="urn:microsoft.com/office/officeart/2005/8/layout/vList2"/>
   </dgm:cxnLst>
@@ -22889,7 +22889,7 @@
                 <a16:creationId xmlns:a16="http://schemas.microsoft.com/office/drawing/2014/main" id="{1BB01FB5-37B9-4EBD-AF40-DE68D3CA46A6}"/>
               </a:ext>
               <a:ext uri="{C183D7F6-B498-43B3-948B-1728B52AA6E4}">
-                <adec:decorative xmlns="" xmlns:adec="http://schemas.microsoft.com/office/drawing/2017/decorative" val="1"/>
+                <adec:decorative xmlns:adec="http://schemas.microsoft.com/office/drawing/2017/decorative" xmlns="" val="1"/>
               </a:ext>
             </a:extLst>
           </p:cNvPr>
@@ -22985,7 +22985,7 @@
                 <a16:creationId xmlns:a16="http://schemas.microsoft.com/office/drawing/2014/main" id="{06AF6A9A-0638-4916-AD29-9FC8FC07AE5F}"/>
               </a:ext>
               <a:ext uri="{C183D7F6-B498-43B3-948B-1728B52AA6E4}">
-                <adec:decorative xmlns="" xmlns:adec="http://schemas.microsoft.com/office/drawing/2017/decorative" val="1"/>
+                <adec:decorative xmlns:adec="http://schemas.microsoft.com/office/drawing/2017/decorative" xmlns="" val="1"/>
               </a:ext>
             </a:extLst>
           </p:cNvPr>
@@ -23177,7 +23177,7 @@
                 <a16:creationId xmlns:a16="http://schemas.microsoft.com/office/drawing/2014/main" id="{79057B2B-0D8C-47F2-836B-2E7DD462150A}"/>
               </a:ext>
               <a:ext uri="{C183D7F6-B498-43B3-948B-1728B52AA6E4}">
-                <adec:decorative xmlns="" xmlns:adec="http://schemas.microsoft.com/office/drawing/2017/decorative" val="1"/>
+                <adec:decorative xmlns:adec="http://schemas.microsoft.com/office/drawing/2017/decorative" xmlns="" val="1"/>
               </a:ext>
             </a:extLst>
           </p:cNvPr>
@@ -23321,7 +23321,7 @@
                 <a16:creationId xmlns:a16="http://schemas.microsoft.com/office/drawing/2014/main" id="{1BB01FB5-37B9-4EBD-AF40-DE68D3CA46A6}"/>
               </a:ext>
               <a:ext uri="{C183D7F6-B498-43B3-948B-1728B52AA6E4}">
-                <adec:decorative xmlns="" xmlns:adec="http://schemas.microsoft.com/office/drawing/2017/decorative" val="1"/>
+                <adec:decorative xmlns:adec="http://schemas.microsoft.com/office/drawing/2017/decorative" xmlns="" val="1"/>
               </a:ext>
             </a:extLst>
           </p:cNvPr>
@@ -23417,7 +23417,7 @@
                 <a16:creationId xmlns:a16="http://schemas.microsoft.com/office/drawing/2014/main" id="{06AF6A9A-0638-4916-AD29-9FC8FC07AE5F}"/>
               </a:ext>
               <a:ext uri="{C183D7F6-B498-43B3-948B-1728B52AA6E4}">
-                <adec:decorative xmlns="" xmlns:adec="http://schemas.microsoft.com/office/drawing/2017/decorative" val="1"/>
+                <adec:decorative xmlns:adec="http://schemas.microsoft.com/office/drawing/2017/decorative" xmlns="" val="1"/>
               </a:ext>
             </a:extLst>
           </p:cNvPr>
@@ -23609,7 +23609,7 @@
                 <a16:creationId xmlns:a16="http://schemas.microsoft.com/office/drawing/2014/main" id="{79057B2B-0D8C-47F2-836B-2E7DD462150A}"/>
               </a:ext>
               <a:ext uri="{C183D7F6-B498-43B3-948B-1728B52AA6E4}">
-                <adec:decorative xmlns="" xmlns:adec="http://schemas.microsoft.com/office/drawing/2017/decorative" val="1"/>
+                <adec:decorative xmlns:adec="http://schemas.microsoft.com/office/drawing/2017/decorative" xmlns="" val="1"/>
               </a:ext>
             </a:extLst>
           </p:cNvPr>
@@ -23738,7 +23738,7 @@
                 <a16:creationId xmlns:a16="http://schemas.microsoft.com/office/drawing/2014/main" id="{CD306B45-25EE-434D-ABA9-A27B79320CFF}"/>
               </a:ext>
               <a:ext uri="{C183D7F6-B498-43B3-948B-1728B52AA6E4}">
-                <adec:decorative xmlns="" xmlns:adec="http://schemas.microsoft.com/office/drawing/2017/decorative" val="1"/>
+                <adec:decorative xmlns:adec="http://schemas.microsoft.com/office/drawing/2017/decorative" xmlns="" val="1"/>
               </a:ext>
             </a:extLst>
           </p:cNvPr>
@@ -23833,7 +23833,7 @@
                 <a16:creationId xmlns:a16="http://schemas.microsoft.com/office/drawing/2014/main" id="{0A42F85E-4939-431E-8B4A-EC07C8E0AB65}"/>
               </a:ext>
               <a:ext uri="{C183D7F6-B498-43B3-948B-1728B52AA6E4}">
-                <adec:decorative xmlns="" xmlns:adec="http://schemas.microsoft.com/office/drawing/2017/decorative" val="1"/>
+                <adec:decorative xmlns:adec="http://schemas.microsoft.com/office/drawing/2017/decorative" xmlns="" val="1"/>
               </a:ext>
             </a:extLst>
           </p:cNvPr>
@@ -23887,7 +23887,7 @@
                 <a16:creationId xmlns:a16="http://schemas.microsoft.com/office/drawing/2014/main" id="{27EBB3F9-D6F7-4F6A-8843-9FEBA15E4969}"/>
               </a:ext>
               <a:ext uri="{C183D7F6-B498-43B3-948B-1728B52AA6E4}">
-                <adec:decorative xmlns="" xmlns:adec="http://schemas.microsoft.com/office/drawing/2017/decorative" val="1"/>
+                <adec:decorative xmlns:adec="http://schemas.microsoft.com/office/drawing/2017/decorative" xmlns="" val="1"/>
               </a:ext>
             </a:extLst>
           </p:cNvPr>
@@ -23939,7 +23939,7 @@
                 <a16:creationId xmlns:a16="http://schemas.microsoft.com/office/drawing/2014/main" id="{5D2B17EF-74EB-4C33-B2E2-8E727B2E7D68}"/>
               </a:ext>
               <a:ext uri="{C183D7F6-B498-43B3-948B-1728B52AA6E4}">
-                <adec:decorative xmlns="" xmlns:adec="http://schemas.microsoft.com/office/drawing/2017/decorative" val="1"/>
+                <adec:decorative xmlns:adec="http://schemas.microsoft.com/office/drawing/2017/decorative" xmlns="" val="1"/>
               </a:ext>
             </a:extLst>
           </p:cNvPr>
@@ -23975,7 +23975,7 @@
                   <a16:creationId xmlns:a16="http://schemas.microsoft.com/office/drawing/2014/main" id="{0A5F1F8A-3206-4B86-883F-65E98BB6E475}"/>
                 </a:ext>
                 <a:ext uri="{C183D7F6-B498-43B3-948B-1728B52AA6E4}">
-                  <adec:decorative xmlns="" xmlns:adec="http://schemas.microsoft.com/office/drawing/2017/decorative" val="1"/>
+                  <adec:decorative xmlns:adec="http://schemas.microsoft.com/office/drawing/2017/decorative" xmlns="" val="1"/>
                 </a:ext>
               </a:extLst>
             </p:cNvPr>
@@ -24047,7 +24047,7 @@
                   <a16:creationId xmlns:a16="http://schemas.microsoft.com/office/drawing/2014/main" id="{6935F8C7-CC88-4243-9786-F3CDBF04A09F}"/>
                 </a:ext>
                 <a:ext uri="{C183D7F6-B498-43B3-948B-1728B52AA6E4}">
-                  <adec:decorative xmlns="" xmlns:adec="http://schemas.microsoft.com/office/drawing/2017/decorative" val="1"/>
+                  <adec:decorative xmlns:adec="http://schemas.microsoft.com/office/drawing/2017/decorative" xmlns="" val="1"/>
                 </a:ext>
               </a:extLst>
             </p:cNvPr>
@@ -24124,7 +24124,7 @@
                   <a16:creationId xmlns:a16="http://schemas.microsoft.com/office/drawing/2014/main" id="{9AF7BAD9-71B3-40D8-A089-EFF7FE67BD66}"/>
                 </a:ext>
                 <a:ext uri="{C183D7F6-B498-43B3-948B-1728B52AA6E4}">
-                  <adec:decorative xmlns="" xmlns:adec="http://schemas.microsoft.com/office/drawing/2017/decorative" val="1"/>
+                  <adec:decorative xmlns:adec="http://schemas.microsoft.com/office/drawing/2017/decorative" xmlns="" val="1"/>
                 </a:ext>
               </a:extLst>
             </p:cNvPr>
@@ -24206,7 +24206,7 @@
                   <a16:creationId xmlns:a16="http://schemas.microsoft.com/office/drawing/2014/main" id="{6467094F-AEF0-4D3B-BB76-8B3C1F08B937}"/>
                 </a:ext>
                 <a:ext uri="{C183D7F6-B498-43B3-948B-1728B52AA6E4}">
-                  <adec:decorative xmlns="" xmlns:adec="http://schemas.microsoft.com/office/drawing/2017/decorative" val="1"/>
+                  <adec:decorative xmlns:adec="http://schemas.microsoft.com/office/drawing/2017/decorative" xmlns="" val="1"/>
                 </a:ext>
               </a:extLst>
             </p:cNvPr>
@@ -24268,7 +24268,7 @@
                   <a16:creationId xmlns:a16="http://schemas.microsoft.com/office/drawing/2014/main" id="{36F56AF9-DEF1-44E7-BF42-6AAC1AA9D19D}"/>
                 </a:ext>
                 <a:ext uri="{C183D7F6-B498-43B3-948B-1728B52AA6E4}">
-                  <adec:decorative xmlns="" xmlns:adec="http://schemas.microsoft.com/office/drawing/2017/decorative" val="1"/>
+                  <adec:decorative xmlns:adec="http://schemas.microsoft.com/office/drawing/2017/decorative" xmlns="" val="1"/>
                 </a:ext>
               </a:extLst>
             </p:cNvPr>
@@ -24365,7 +24365,7 @@
                   <a16:creationId xmlns:a16="http://schemas.microsoft.com/office/drawing/2014/main" id="{A43EBE71-20BA-4A40-A513-516678089D11}"/>
                 </a:ext>
                 <a:ext uri="{C183D7F6-B498-43B3-948B-1728B52AA6E4}">
-                  <adec:decorative xmlns="" xmlns:adec="http://schemas.microsoft.com/office/drawing/2017/decorative" val="1"/>
+                  <adec:decorative xmlns:adec="http://schemas.microsoft.com/office/drawing/2017/decorative" xmlns="" val="1"/>
                 </a:ext>
               </a:extLst>
             </p:cNvPr>
@@ -24457,7 +24457,7 @@
                   <a16:creationId xmlns:a16="http://schemas.microsoft.com/office/drawing/2014/main" id="{1DB39648-7B38-4D0B-93C5-048EC4A45C99}"/>
                 </a:ext>
                 <a:ext uri="{C183D7F6-B498-43B3-948B-1728B52AA6E4}">
-                  <adec:decorative xmlns="" xmlns:adec="http://schemas.microsoft.com/office/drawing/2017/decorative" val="1"/>
+                  <adec:decorative xmlns:adec="http://schemas.microsoft.com/office/drawing/2017/decorative" xmlns="" val="1"/>
                 </a:ext>
               </a:extLst>
             </p:cNvPr>
@@ -24529,7 +24529,7 @@
                   <a16:creationId xmlns:a16="http://schemas.microsoft.com/office/drawing/2014/main" id="{8DD2661F-DE5F-45EA-B30B-7C6589638836}"/>
                 </a:ext>
                 <a:ext uri="{C183D7F6-B498-43B3-948B-1728B52AA6E4}">
-                  <adec:decorative xmlns="" xmlns:adec="http://schemas.microsoft.com/office/drawing/2017/decorative" val="1"/>
+                  <adec:decorative xmlns:adec="http://schemas.microsoft.com/office/drawing/2017/decorative" xmlns="" val="1"/>
                 </a:ext>
               </a:extLst>
             </p:cNvPr>
@@ -24621,7 +24621,7 @@
                   <a16:creationId xmlns:a16="http://schemas.microsoft.com/office/drawing/2014/main" id="{ABF0A0E5-E68E-4183-A913-228692FD85EC}"/>
                 </a:ext>
                 <a:ext uri="{C183D7F6-B498-43B3-948B-1728B52AA6E4}">
-                  <adec:decorative xmlns="" xmlns:adec="http://schemas.microsoft.com/office/drawing/2017/decorative" val="1"/>
+                  <adec:decorative xmlns:adec="http://schemas.microsoft.com/office/drawing/2017/decorative" xmlns="" val="1"/>
                 </a:ext>
               </a:extLst>
             </p:cNvPr>
@@ -24748,7 +24748,7 @@
                   <a16:creationId xmlns:a16="http://schemas.microsoft.com/office/drawing/2014/main" id="{615D8F55-8ACD-4EFE-A832-06E785479EA5}"/>
                 </a:ext>
                 <a:ext uri="{C183D7F6-B498-43B3-948B-1728B52AA6E4}">
-                  <adec:decorative xmlns="" xmlns:adec="http://schemas.microsoft.com/office/drawing/2017/decorative" val="1"/>
+                  <adec:decorative xmlns:adec="http://schemas.microsoft.com/office/drawing/2017/decorative" xmlns="" val="1"/>
                 </a:ext>
               </a:extLst>
             </p:cNvPr>
@@ -24810,7 +24810,7 @@
                   <a16:creationId xmlns:a16="http://schemas.microsoft.com/office/drawing/2014/main" id="{0FDF4201-8CEC-474B-A6B1-88039B70416F}"/>
                 </a:ext>
                 <a:ext uri="{C183D7F6-B498-43B3-948B-1728B52AA6E4}">
-                  <adec:decorative xmlns="" xmlns:adec="http://schemas.microsoft.com/office/drawing/2017/decorative" val="1"/>
+                  <adec:decorative xmlns:adec="http://schemas.microsoft.com/office/drawing/2017/decorative" xmlns="" val="1"/>
                 </a:ext>
               </a:extLst>
             </p:cNvPr>
@@ -24882,7 +24882,7 @@
                   <a16:creationId xmlns:a16="http://schemas.microsoft.com/office/drawing/2014/main" id="{0F60AEA4-B25F-417E-93FC-59686DFBE56E}"/>
                 </a:ext>
                 <a:ext uri="{C183D7F6-B498-43B3-948B-1728B52AA6E4}">
-                  <adec:decorative xmlns="" xmlns:adec="http://schemas.microsoft.com/office/drawing/2017/decorative" val="1"/>
+                  <adec:decorative xmlns:adec="http://schemas.microsoft.com/office/drawing/2017/decorative" xmlns="" val="1"/>
                 </a:ext>
               </a:extLst>
             </p:cNvPr>
@@ -25077,7 +25077,7 @@
                 <a16:creationId xmlns:a16="http://schemas.microsoft.com/office/drawing/2014/main" id="{1BB01FB5-37B9-4EBD-AF40-DE68D3CA46A6}"/>
               </a:ext>
               <a:ext uri="{C183D7F6-B498-43B3-948B-1728B52AA6E4}">
-                <adec:decorative xmlns="" xmlns:adec="http://schemas.microsoft.com/office/drawing/2017/decorative" val="1"/>
+                <adec:decorative xmlns:adec="http://schemas.microsoft.com/office/drawing/2017/decorative" xmlns="" val="1"/>
               </a:ext>
             </a:extLst>
           </p:cNvPr>
@@ -25173,7 +25173,7 @@
                 <a16:creationId xmlns:a16="http://schemas.microsoft.com/office/drawing/2014/main" id="{06AF6A9A-0638-4916-AD29-9FC8FC07AE5F}"/>
               </a:ext>
               <a:ext uri="{C183D7F6-B498-43B3-948B-1728B52AA6E4}">
-                <adec:decorative xmlns="" xmlns:adec="http://schemas.microsoft.com/office/drawing/2017/decorative" val="1"/>
+                <adec:decorative xmlns:adec="http://schemas.microsoft.com/office/drawing/2017/decorative" xmlns="" val="1"/>
               </a:ext>
             </a:extLst>
           </p:cNvPr>
@@ -25365,7 +25365,7 @@
                 <a16:creationId xmlns:a16="http://schemas.microsoft.com/office/drawing/2014/main" id="{79057B2B-0D8C-47F2-836B-2E7DD462150A}"/>
               </a:ext>
               <a:ext uri="{C183D7F6-B498-43B3-948B-1728B52AA6E4}">
-                <adec:decorative xmlns="" xmlns:adec="http://schemas.microsoft.com/office/drawing/2017/decorative" val="1"/>
+                <adec:decorative xmlns:adec="http://schemas.microsoft.com/office/drawing/2017/decorative" xmlns="" val="1"/>
               </a:ext>
             </a:extLst>
           </p:cNvPr>
@@ -25509,7 +25509,7 @@
                 <a16:creationId xmlns:a16="http://schemas.microsoft.com/office/drawing/2014/main" id="{1BB01FB5-37B9-4EBD-AF40-DE68D3CA46A6}"/>
               </a:ext>
               <a:ext uri="{C183D7F6-B498-43B3-948B-1728B52AA6E4}">
-                <adec:decorative xmlns="" xmlns:adec="http://schemas.microsoft.com/office/drawing/2017/decorative" val="1"/>
+                <adec:decorative xmlns:adec="http://schemas.microsoft.com/office/drawing/2017/decorative" xmlns="" val="1"/>
               </a:ext>
             </a:extLst>
           </p:cNvPr>
@@ -25605,7 +25605,7 @@
                 <a16:creationId xmlns:a16="http://schemas.microsoft.com/office/drawing/2014/main" id="{06AF6A9A-0638-4916-AD29-9FC8FC07AE5F}"/>
               </a:ext>
               <a:ext uri="{C183D7F6-B498-43B3-948B-1728B52AA6E4}">
-                <adec:decorative xmlns="" xmlns:adec="http://schemas.microsoft.com/office/drawing/2017/decorative" val="1"/>
+                <adec:decorative xmlns:adec="http://schemas.microsoft.com/office/drawing/2017/decorative" xmlns="" val="1"/>
               </a:ext>
             </a:extLst>
           </p:cNvPr>
@@ -25797,7 +25797,7 @@
                 <a16:creationId xmlns:a16="http://schemas.microsoft.com/office/drawing/2014/main" id="{79057B2B-0D8C-47F2-836B-2E7DD462150A}"/>
               </a:ext>
               <a:ext uri="{C183D7F6-B498-43B3-948B-1728B52AA6E4}">
-                <adec:decorative xmlns="" xmlns:adec="http://schemas.microsoft.com/office/drawing/2017/decorative" val="1"/>
+                <adec:decorative xmlns:adec="http://schemas.microsoft.com/office/drawing/2017/decorative" xmlns="" val="1"/>
               </a:ext>
             </a:extLst>
           </p:cNvPr>
@@ -25926,7 +25926,7 @@
                 <a16:creationId xmlns:a16="http://schemas.microsoft.com/office/drawing/2014/main" id="{CD306B45-25EE-434D-ABA9-A27B79320CFF}"/>
               </a:ext>
               <a:ext uri="{C183D7F6-B498-43B3-948B-1728B52AA6E4}">
-                <adec:decorative xmlns="" xmlns:adec="http://schemas.microsoft.com/office/drawing/2017/decorative" val="1"/>
+                <adec:decorative xmlns:adec="http://schemas.microsoft.com/office/drawing/2017/decorative" xmlns="" val="1"/>
               </a:ext>
             </a:extLst>
           </p:cNvPr>
@@ -26021,7 +26021,7 @@
                 <a16:creationId xmlns:a16="http://schemas.microsoft.com/office/drawing/2014/main" id="{0A42F85E-4939-431E-8B4A-EC07C8E0AB65}"/>
               </a:ext>
               <a:ext uri="{C183D7F6-B498-43B3-948B-1728B52AA6E4}">
-                <adec:decorative xmlns="" xmlns:adec="http://schemas.microsoft.com/office/drawing/2017/decorative" val="1"/>
+                <adec:decorative xmlns:adec="http://schemas.microsoft.com/office/drawing/2017/decorative" xmlns="" val="1"/>
               </a:ext>
             </a:extLst>
           </p:cNvPr>
@@ -26075,7 +26075,7 @@
                 <a16:creationId xmlns:a16="http://schemas.microsoft.com/office/drawing/2014/main" id="{27EBB3F9-D6F7-4F6A-8843-9FEBA15E4969}"/>
               </a:ext>
               <a:ext uri="{C183D7F6-B498-43B3-948B-1728B52AA6E4}">
-                <adec:decorative xmlns="" xmlns:adec="http://schemas.microsoft.com/office/drawing/2017/decorative" val="1"/>
+                <adec:decorative xmlns:adec="http://schemas.microsoft.com/office/drawing/2017/decorative" xmlns="" val="1"/>
               </a:ext>
             </a:extLst>
           </p:cNvPr>
@@ -26127,7 +26127,7 @@
                 <a16:creationId xmlns:a16="http://schemas.microsoft.com/office/drawing/2014/main" id="{5D2B17EF-74EB-4C33-B2E2-8E727B2E7D68}"/>
               </a:ext>
               <a:ext uri="{C183D7F6-B498-43B3-948B-1728B52AA6E4}">
-                <adec:decorative xmlns="" xmlns:adec="http://schemas.microsoft.com/office/drawing/2017/decorative" val="1"/>
+                <adec:decorative xmlns:adec="http://schemas.microsoft.com/office/drawing/2017/decorative" xmlns="" val="1"/>
               </a:ext>
             </a:extLst>
           </p:cNvPr>
@@ -26163,7 +26163,7 @@
                   <a16:creationId xmlns:a16="http://schemas.microsoft.com/office/drawing/2014/main" id="{0A5F1F8A-3206-4B86-883F-65E98BB6E475}"/>
                 </a:ext>
                 <a:ext uri="{C183D7F6-B498-43B3-948B-1728B52AA6E4}">
-                  <adec:decorative xmlns="" xmlns:adec="http://schemas.microsoft.com/office/drawing/2017/decorative" val="1"/>
+                  <adec:decorative xmlns:adec="http://schemas.microsoft.com/office/drawing/2017/decorative" xmlns="" val="1"/>
                 </a:ext>
               </a:extLst>
             </p:cNvPr>
@@ -26235,7 +26235,7 @@
                   <a16:creationId xmlns:a16="http://schemas.microsoft.com/office/drawing/2014/main" id="{6935F8C7-CC88-4243-9786-F3CDBF04A09F}"/>
                 </a:ext>
                 <a:ext uri="{C183D7F6-B498-43B3-948B-1728B52AA6E4}">
-                  <adec:decorative xmlns="" xmlns:adec="http://schemas.microsoft.com/office/drawing/2017/decorative" val="1"/>
+                  <adec:decorative xmlns:adec="http://schemas.microsoft.com/office/drawing/2017/decorative" xmlns="" val="1"/>
                 </a:ext>
               </a:extLst>
             </p:cNvPr>
@@ -26312,7 +26312,7 @@
                   <a16:creationId xmlns:a16="http://schemas.microsoft.com/office/drawing/2014/main" id="{9AF7BAD9-71B3-40D8-A089-EFF7FE67BD66}"/>
                 </a:ext>
                 <a:ext uri="{C183D7F6-B498-43B3-948B-1728B52AA6E4}">
-                  <adec:decorative xmlns="" xmlns:adec="http://schemas.microsoft.com/office/drawing/2017/decorative" val="1"/>
+                  <adec:decorative xmlns:adec="http://schemas.microsoft.com/office/drawing/2017/decorative" xmlns="" val="1"/>
                 </a:ext>
               </a:extLst>
             </p:cNvPr>
@@ -26394,7 +26394,7 @@
                   <a16:creationId xmlns:a16="http://schemas.microsoft.com/office/drawing/2014/main" id="{6467094F-AEF0-4D3B-BB76-8B3C1F08B937}"/>
                 </a:ext>
                 <a:ext uri="{C183D7F6-B498-43B3-948B-1728B52AA6E4}">
-                  <adec:decorative xmlns="" xmlns:adec="http://schemas.microsoft.com/office/drawing/2017/decorative" val="1"/>
+                  <adec:decorative xmlns:adec="http://schemas.microsoft.com/office/drawing/2017/decorative" xmlns="" val="1"/>
                 </a:ext>
               </a:extLst>
             </p:cNvPr>
@@ -26456,7 +26456,7 @@
                   <a16:creationId xmlns:a16="http://schemas.microsoft.com/office/drawing/2014/main" id="{36F56AF9-DEF1-44E7-BF42-6AAC1AA9D19D}"/>
                 </a:ext>
                 <a:ext uri="{C183D7F6-B498-43B3-948B-1728B52AA6E4}">
-                  <adec:decorative xmlns="" xmlns:adec="http://schemas.microsoft.com/office/drawing/2017/decorative" val="1"/>
+                  <adec:decorative xmlns:adec="http://schemas.microsoft.com/office/drawing/2017/decorative" xmlns="" val="1"/>
                 </a:ext>
               </a:extLst>
             </p:cNvPr>
@@ -26553,7 +26553,7 @@
                   <a16:creationId xmlns:a16="http://schemas.microsoft.com/office/drawing/2014/main" id="{A43EBE71-20BA-4A40-A513-516678089D11}"/>
                 </a:ext>
                 <a:ext uri="{C183D7F6-B498-43B3-948B-1728B52AA6E4}">
-                  <adec:decorative xmlns="" xmlns:adec="http://schemas.microsoft.com/office/drawing/2017/decorative" val="1"/>
+                  <adec:decorative xmlns:adec="http://schemas.microsoft.com/office/drawing/2017/decorative" xmlns="" val="1"/>
                 </a:ext>
               </a:extLst>
             </p:cNvPr>
@@ -26645,7 +26645,7 @@
                   <a16:creationId xmlns:a16="http://schemas.microsoft.com/office/drawing/2014/main" id="{1DB39648-7B38-4D0B-93C5-048EC4A45C99}"/>
                 </a:ext>
                 <a:ext uri="{C183D7F6-B498-43B3-948B-1728B52AA6E4}">
-                  <adec:decorative xmlns="" xmlns:adec="http://schemas.microsoft.com/office/drawing/2017/decorative" val="1"/>
+                  <adec:decorative xmlns:adec="http://schemas.microsoft.com/office/drawing/2017/decorative" xmlns="" val="1"/>
                 </a:ext>
               </a:extLst>
             </p:cNvPr>
@@ -26717,7 +26717,7 @@
                   <a16:creationId xmlns:a16="http://schemas.microsoft.com/office/drawing/2014/main" id="{8DD2661F-DE5F-45EA-B30B-7C6589638836}"/>
                 </a:ext>
                 <a:ext uri="{C183D7F6-B498-43B3-948B-1728B52AA6E4}">
-                  <adec:decorative xmlns="" xmlns:adec="http://schemas.microsoft.com/office/drawing/2017/decorative" val="1"/>
+                  <adec:decorative xmlns:adec="http://schemas.microsoft.com/office/drawing/2017/decorative" xmlns="" val="1"/>
                 </a:ext>
               </a:extLst>
             </p:cNvPr>
@@ -26809,7 +26809,7 @@
                   <a16:creationId xmlns:a16="http://schemas.microsoft.com/office/drawing/2014/main" id="{ABF0A0E5-E68E-4183-A913-228692FD85EC}"/>
                 </a:ext>
                 <a:ext uri="{C183D7F6-B498-43B3-948B-1728B52AA6E4}">
-                  <adec:decorative xmlns="" xmlns:adec="http://schemas.microsoft.com/office/drawing/2017/decorative" val="1"/>
+                  <adec:decorative xmlns:adec="http://schemas.microsoft.com/office/drawing/2017/decorative" xmlns="" val="1"/>
                 </a:ext>
               </a:extLst>
             </p:cNvPr>
@@ -26936,7 +26936,7 @@
                   <a16:creationId xmlns:a16="http://schemas.microsoft.com/office/drawing/2014/main" id="{615D8F55-8ACD-4EFE-A832-06E785479EA5}"/>
                 </a:ext>
                 <a:ext uri="{C183D7F6-B498-43B3-948B-1728B52AA6E4}">
-                  <adec:decorative xmlns="" xmlns:adec="http://schemas.microsoft.com/office/drawing/2017/decorative" val="1"/>
+                  <adec:decorative xmlns:adec="http://schemas.microsoft.com/office/drawing/2017/decorative" xmlns="" val="1"/>
                 </a:ext>
               </a:extLst>
             </p:cNvPr>
@@ -26998,7 +26998,7 @@
                   <a16:creationId xmlns:a16="http://schemas.microsoft.com/office/drawing/2014/main" id="{0FDF4201-8CEC-474B-A6B1-88039B70416F}"/>
                 </a:ext>
                 <a:ext uri="{C183D7F6-B498-43B3-948B-1728B52AA6E4}">
-                  <adec:decorative xmlns="" xmlns:adec="http://schemas.microsoft.com/office/drawing/2017/decorative" val="1"/>
+                  <adec:decorative xmlns:adec="http://schemas.microsoft.com/office/drawing/2017/decorative" xmlns="" val="1"/>
                 </a:ext>
               </a:extLst>
             </p:cNvPr>
@@ -27070,7 +27070,7 @@
                   <a16:creationId xmlns:a16="http://schemas.microsoft.com/office/drawing/2014/main" id="{0F60AEA4-B25F-417E-93FC-59686DFBE56E}"/>
                 </a:ext>
                 <a:ext uri="{C183D7F6-B498-43B3-948B-1728B52AA6E4}">
-                  <adec:decorative xmlns="" xmlns:adec="http://schemas.microsoft.com/office/drawing/2017/decorative" val="1"/>
+                  <adec:decorative xmlns:adec="http://schemas.microsoft.com/office/drawing/2017/decorative" xmlns="" val="1"/>
                 </a:ext>
               </a:extLst>
             </p:cNvPr>
@@ -27310,6 +27310,36 @@
           <a:chExt cx="0" cy="0"/>
         </a:xfrm>
       </p:grpSpPr>
+      <p:pic>
+        <p:nvPicPr>
+          <p:cNvPr id="2" name="Picture 1"/>
+          <p:cNvPicPr>
+            <a:picLocks noChangeAspect="1"/>
+          </p:cNvPicPr>
+          <p:nvPr/>
+        </p:nvPicPr>
+        <p:blipFill>
+          <a:blip r:embed="rId2">
+            <a:extLst>
+              <a:ext uri="{28A0092B-C50C-407E-A947-70E740481C1C}">
+                <a14:useLocalDpi xmlns:a14="http://schemas.microsoft.com/office/drawing/2010/main" val="0"/>
+              </a:ext>
+            </a:extLst>
+          </a:blip>
+          <a:stretch>
+            <a:fillRect/>
+          </a:stretch>
+        </p:blipFill>
+        <p:spPr>
+          <a:xfrm>
+            <a:off x="1730676" y="1247506"/>
+            <a:ext cx="8728820" cy="4388523"/>
+          </a:xfrm>
+          <a:prstGeom prst="rect">
+            <a:avLst/>
+          </a:prstGeom>
+        </p:spPr>
+      </p:pic>
     </p:spTree>
     <p:extLst>
       <p:ext uri="{BB962C8B-B14F-4D97-AF65-F5344CB8AC3E}">
@@ -27340,6 +27370,36 @@
           <a:chExt cx="0" cy="0"/>
         </a:xfrm>
       </p:grpSpPr>
+      <p:pic>
+        <p:nvPicPr>
+          <p:cNvPr id="3" name="Picture 2"/>
+          <p:cNvPicPr>
+            <a:picLocks noChangeAspect="1"/>
+          </p:cNvPicPr>
+          <p:nvPr/>
+        </p:nvPicPr>
+        <p:blipFill>
+          <a:blip r:embed="rId2" cstate="print">
+            <a:extLst>
+              <a:ext uri="{28A0092B-C50C-407E-A947-70E740481C1C}">
+                <a14:useLocalDpi xmlns:a14="http://schemas.microsoft.com/office/drawing/2010/main" val="0"/>
+              </a:ext>
+            </a:extLst>
+          </a:blip>
+          <a:stretch>
+            <a:fillRect/>
+          </a:stretch>
+        </p:blipFill>
+        <p:spPr>
+          <a:xfrm>
+            <a:off x="66502" y="1637149"/>
+            <a:ext cx="12053456" cy="3807686"/>
+          </a:xfrm>
+          <a:prstGeom prst="rect">
+            <a:avLst/>
+          </a:prstGeom>
+        </p:spPr>
+      </p:pic>
     </p:spTree>
     <p:extLst>
       <p:ext uri="{BB962C8B-B14F-4D97-AF65-F5344CB8AC3E}">
@@ -27404,7 +27464,7 @@
                 <a16:creationId xmlns:a16="http://schemas.microsoft.com/office/drawing/2014/main" id="{58DF5B7A-7785-49C6-B4EB-252FF28C2132}"/>
               </a:ext>
               <a:ext uri="{C183D7F6-B498-43B3-948B-1728B52AA6E4}">
-                <adec:decorative xmlns="" xmlns:adec="http://schemas.microsoft.com/office/drawing/2017/decorative" val="1"/>
+                <adec:decorative xmlns:adec="http://schemas.microsoft.com/office/drawing/2017/decorative" xmlns="" val="1"/>
               </a:ext>
             </a:extLst>
           </p:cNvPr>
@@ -27435,7 +27495,7 @@
                   <a16:creationId xmlns:a16="http://schemas.microsoft.com/office/drawing/2014/main" id="{78BD0529-90E2-47B4-8D13-CEE11A154183}"/>
                 </a:ext>
                 <a:ext uri="{C183D7F6-B498-43B3-948B-1728B52AA6E4}">
-                  <adec:decorative xmlns="" xmlns:adec="http://schemas.microsoft.com/office/drawing/2017/decorative" val="1"/>
+                  <adec:decorative xmlns:adec="http://schemas.microsoft.com/office/drawing/2017/decorative" xmlns="" val="1"/>
                 </a:ext>
               </a:extLst>
             </p:cNvPr>
@@ -27511,7 +27571,7 @@
                   <a16:creationId xmlns:a16="http://schemas.microsoft.com/office/drawing/2014/main" id="{AE127430-162B-43FD-A02F-6E8AD8FD95EA}"/>
                 </a:ext>
                 <a:ext uri="{C183D7F6-B498-43B3-948B-1728B52AA6E4}">
-                  <adec:decorative xmlns="" xmlns:adec="http://schemas.microsoft.com/office/drawing/2017/decorative" val="1"/>
+                  <adec:decorative xmlns:adec="http://schemas.microsoft.com/office/drawing/2017/decorative" xmlns="" val="1"/>
                 </a:ext>
               </a:extLst>
             </p:cNvPr>
@@ -27592,7 +27652,7 @@
                   <a16:creationId xmlns:a16="http://schemas.microsoft.com/office/drawing/2014/main" id="{7A6023CB-BCF4-4A3C-B04B-EFF677921718}"/>
                 </a:ext>
                 <a:ext uri="{C183D7F6-B498-43B3-948B-1728B52AA6E4}">
-                  <adec:decorative xmlns="" xmlns:adec="http://schemas.microsoft.com/office/drawing/2017/decorative" val="1"/>
+                  <adec:decorative xmlns:adec="http://schemas.microsoft.com/office/drawing/2017/decorative" xmlns="" val="1"/>
                 </a:ext>
               </a:extLst>
             </p:cNvPr>
@@ -27678,7 +27738,7 @@
                   <a16:creationId xmlns:a16="http://schemas.microsoft.com/office/drawing/2014/main" id="{98B0FCF0-0865-45E1-977A-5BFDD0EFCA87}"/>
                 </a:ext>
                 <a:ext uri="{C183D7F6-B498-43B3-948B-1728B52AA6E4}">
-                  <adec:decorative xmlns="" xmlns:adec="http://schemas.microsoft.com/office/drawing/2017/decorative" val="1"/>
+                  <adec:decorative xmlns:adec="http://schemas.microsoft.com/office/drawing/2017/decorative" xmlns="" val="1"/>
                 </a:ext>
               </a:extLst>
             </p:cNvPr>
@@ -27744,7 +27804,7 @@
                   <a16:creationId xmlns:a16="http://schemas.microsoft.com/office/drawing/2014/main" id="{C1FF2792-ADB4-44D2-B7EF-6E3503725DB9}"/>
                 </a:ext>
                 <a:ext uri="{C183D7F6-B498-43B3-948B-1728B52AA6E4}">
-                  <adec:decorative xmlns="" xmlns:adec="http://schemas.microsoft.com/office/drawing/2017/decorative" val="1"/>
+                  <adec:decorative xmlns:adec="http://schemas.microsoft.com/office/drawing/2017/decorative" xmlns="" val="1"/>
                 </a:ext>
               </a:extLst>
             </p:cNvPr>
@@ -27845,7 +27905,7 @@
                   <a16:creationId xmlns:a16="http://schemas.microsoft.com/office/drawing/2014/main" id="{B7B0F0A2-D4CD-4EA5-96E9-9E282F25CD05}"/>
                 </a:ext>
                 <a:ext uri="{C183D7F6-B498-43B3-948B-1728B52AA6E4}">
-                  <adec:decorative xmlns="" xmlns:adec="http://schemas.microsoft.com/office/drawing/2017/decorative" val="1"/>
+                  <adec:decorative xmlns:adec="http://schemas.microsoft.com/office/drawing/2017/decorative" xmlns="" val="1"/>
                 </a:ext>
               </a:extLst>
             </p:cNvPr>
@@ -27941,7 +28001,7 @@
                   <a16:creationId xmlns:a16="http://schemas.microsoft.com/office/drawing/2014/main" id="{FBBC4912-27C6-4C5E-9C40-AE9B6644E54A}"/>
                 </a:ext>
                 <a:ext uri="{C183D7F6-B498-43B3-948B-1728B52AA6E4}">
-                  <adec:decorative xmlns="" xmlns:adec="http://schemas.microsoft.com/office/drawing/2017/decorative" val="1"/>
+                  <adec:decorative xmlns:adec="http://schemas.microsoft.com/office/drawing/2017/decorative" xmlns="" val="1"/>
                 </a:ext>
               </a:extLst>
             </p:cNvPr>
@@ -28017,7 +28077,7 @@
                   <a16:creationId xmlns:a16="http://schemas.microsoft.com/office/drawing/2014/main" id="{127E474D-BE64-49E8-8C82-691642D0BCD1}"/>
                 </a:ext>
                 <a:ext uri="{C183D7F6-B498-43B3-948B-1728B52AA6E4}">
-                  <adec:decorative xmlns="" xmlns:adec="http://schemas.microsoft.com/office/drawing/2017/decorative" val="1"/>
+                  <adec:decorative xmlns:adec="http://schemas.microsoft.com/office/drawing/2017/decorative" xmlns="" val="1"/>
                 </a:ext>
               </a:extLst>
             </p:cNvPr>
@@ -28113,7 +28173,7 @@
                   <a16:creationId xmlns:a16="http://schemas.microsoft.com/office/drawing/2014/main" id="{A385E451-43CB-441B-83EE-28ACB6BCBC89}"/>
                 </a:ext>
                 <a:ext uri="{C183D7F6-B498-43B3-948B-1728B52AA6E4}">
-                  <adec:decorative xmlns="" xmlns:adec="http://schemas.microsoft.com/office/drawing/2017/decorative" val="1"/>
+                  <adec:decorative xmlns:adec="http://schemas.microsoft.com/office/drawing/2017/decorative" xmlns="" val="1"/>
                 </a:ext>
               </a:extLst>
             </p:cNvPr>
@@ -28244,7 +28304,7 @@
                   <a16:creationId xmlns:a16="http://schemas.microsoft.com/office/drawing/2014/main" id="{5BF91B89-051C-49D8-9029-83A1F52B0E38}"/>
                 </a:ext>
                 <a:ext uri="{C183D7F6-B498-43B3-948B-1728B52AA6E4}">
-                  <adec:decorative xmlns="" xmlns:adec="http://schemas.microsoft.com/office/drawing/2017/decorative" val="1"/>
+                  <adec:decorative xmlns:adec="http://schemas.microsoft.com/office/drawing/2017/decorative" xmlns="" val="1"/>
                 </a:ext>
               </a:extLst>
             </p:cNvPr>
@@ -28310,7 +28370,7 @@
                   <a16:creationId xmlns:a16="http://schemas.microsoft.com/office/drawing/2014/main" id="{42329880-D64F-4074-ABE4-348FDC7FB1F4}"/>
                 </a:ext>
                 <a:ext uri="{C183D7F6-B498-43B3-948B-1728B52AA6E4}">
-                  <adec:decorative xmlns="" xmlns:adec="http://schemas.microsoft.com/office/drawing/2017/decorative" val="1"/>
+                  <adec:decorative xmlns:adec="http://schemas.microsoft.com/office/drawing/2017/decorative" xmlns="" val="1"/>
                 </a:ext>
               </a:extLst>
             </p:cNvPr>
@@ -28386,7 +28446,7 @@
                   <a16:creationId xmlns:a16="http://schemas.microsoft.com/office/drawing/2014/main" id="{2FAD4595-5B16-442B-A756-924FB136A5C6}"/>
                 </a:ext>
                 <a:ext uri="{C183D7F6-B498-43B3-948B-1728B52AA6E4}">
-                  <adec:decorative xmlns="" xmlns:adec="http://schemas.microsoft.com/office/drawing/2017/decorative" val="1"/>
+                  <adec:decorative xmlns:adec="http://schemas.microsoft.com/office/drawing/2017/decorative" xmlns="" val="1"/>
                 </a:ext>
               </a:extLst>
             </p:cNvPr>
@@ -28473,7 +28533,7 @@
                 <a16:creationId xmlns:a16="http://schemas.microsoft.com/office/drawing/2014/main" id="{9F9B151E-1B34-4FA6-A53D-B92F787D9EAD}"/>
               </a:ext>
               <a:ext uri="{C183D7F6-B498-43B3-948B-1728B52AA6E4}">
-                <adec:decorative xmlns="" xmlns:adec="http://schemas.microsoft.com/office/drawing/2017/decorative" val="1"/>
+                <adec:decorative xmlns:adec="http://schemas.microsoft.com/office/drawing/2017/decorative" xmlns="" val="1"/>
               </a:ext>
             </a:extLst>
           </p:cNvPr>
@@ -28504,7 +28564,7 @@
                   <a16:creationId xmlns:a16="http://schemas.microsoft.com/office/drawing/2014/main" id="{617ED8F6-0AA2-4080-ADCB-6C7CE17598B9}"/>
                 </a:ext>
                 <a:ext uri="{C183D7F6-B498-43B3-948B-1728B52AA6E4}">
-                  <adec:decorative xmlns="" xmlns:adec="http://schemas.microsoft.com/office/drawing/2017/decorative" val="1"/>
+                  <adec:decorative xmlns:adec="http://schemas.microsoft.com/office/drawing/2017/decorative" xmlns="" val="1"/>
                 </a:ext>
               </a:extLst>
             </p:cNvPr>
@@ -28623,7 +28683,7 @@
                   <a16:creationId xmlns:a16="http://schemas.microsoft.com/office/drawing/2014/main" id="{76F017FD-AF02-4E22-A564-5DCC93F5368C}"/>
                 </a:ext>
                 <a:ext uri="{C183D7F6-B498-43B3-948B-1728B52AA6E4}">
-                  <adec:decorative xmlns="" xmlns:adec="http://schemas.microsoft.com/office/drawing/2017/decorative" val="1"/>
+                  <adec:decorative xmlns:adec="http://schemas.microsoft.com/office/drawing/2017/decorative" xmlns="" val="1"/>
                 </a:ext>
               </a:extLst>
             </p:cNvPr>
@@ -28707,7 +28767,7 @@
                   <a16:creationId xmlns:a16="http://schemas.microsoft.com/office/drawing/2014/main" id="{61F8A187-FAA8-4625-AC70-EE2C7499D5AB}"/>
                 </a:ext>
                 <a:ext uri="{C183D7F6-B498-43B3-948B-1728B52AA6E4}">
-                  <adec:decorative xmlns="" xmlns:adec="http://schemas.microsoft.com/office/drawing/2017/decorative" val="1"/>
+                  <adec:decorative xmlns:adec="http://schemas.microsoft.com/office/drawing/2017/decorative" xmlns="" val="1"/>
                 </a:ext>
               </a:extLst>
             </p:cNvPr>
@@ -28791,7 +28851,7 @@
                   <a16:creationId xmlns:a16="http://schemas.microsoft.com/office/drawing/2014/main" id="{6D431C21-669A-42BC-A2DF-9092CA729B25}"/>
                 </a:ext>
                 <a:ext uri="{C183D7F6-B498-43B3-948B-1728B52AA6E4}">
-                  <adec:decorative xmlns="" xmlns:adec="http://schemas.microsoft.com/office/drawing/2017/decorative" val="1"/>
+                  <adec:decorative xmlns:adec="http://schemas.microsoft.com/office/drawing/2017/decorative" xmlns="" val="1"/>
                 </a:ext>
               </a:extLst>
             </p:cNvPr>
@@ -28890,7 +28950,7 @@
                   <a16:creationId xmlns:a16="http://schemas.microsoft.com/office/drawing/2014/main" id="{D143DDDF-3A80-4C43-BBCF-8EC128010208}"/>
                 </a:ext>
                 <a:ext uri="{C183D7F6-B498-43B3-948B-1728B52AA6E4}">
-                  <adec:decorative xmlns="" xmlns:adec="http://schemas.microsoft.com/office/drawing/2017/decorative" val="1"/>
+                  <adec:decorative xmlns:adec="http://schemas.microsoft.com/office/drawing/2017/decorative" xmlns="" val="1"/>
                 </a:ext>
               </a:extLst>
             </p:cNvPr>
@@ -28999,7 +29059,7 @@
                   <a16:creationId xmlns:a16="http://schemas.microsoft.com/office/drawing/2014/main" id="{313BFF88-4BDD-4CC4-A514-C7D655779147}"/>
                 </a:ext>
                 <a:ext uri="{C183D7F6-B498-43B3-948B-1728B52AA6E4}">
-                  <adec:decorative xmlns="" xmlns:adec="http://schemas.microsoft.com/office/drawing/2017/decorative" val="1"/>
+                  <adec:decorative xmlns:adec="http://schemas.microsoft.com/office/drawing/2017/decorative" xmlns="" val="1"/>
                 </a:ext>
               </a:extLst>
             </p:cNvPr>
@@ -29063,7 +29123,7 @@
                   <a16:creationId xmlns:a16="http://schemas.microsoft.com/office/drawing/2014/main" id="{BA235B4A-F8AD-4C1E-9074-3562538136C5}"/>
                 </a:ext>
                 <a:ext uri="{C183D7F6-B498-43B3-948B-1728B52AA6E4}">
-                  <adec:decorative xmlns="" xmlns:adec="http://schemas.microsoft.com/office/drawing/2017/decorative" val="1"/>
+                  <adec:decorative xmlns:adec="http://schemas.microsoft.com/office/drawing/2017/decorative" xmlns="" val="1"/>
                 </a:ext>
               </a:extLst>
             </p:cNvPr>
@@ -29142,7 +29202,7 @@
                   <a16:creationId xmlns:a16="http://schemas.microsoft.com/office/drawing/2014/main" id="{281D9204-5CB0-44D1-B01F-5FFF6BDB2883}"/>
                 </a:ext>
                 <a:ext uri="{C183D7F6-B498-43B3-948B-1728B52AA6E4}">
-                  <adec:decorative xmlns="" xmlns:adec="http://schemas.microsoft.com/office/drawing/2017/decorative" val="1"/>
+                  <adec:decorative xmlns:adec="http://schemas.microsoft.com/office/drawing/2017/decorative" xmlns="" val="1"/>
                 </a:ext>
               </a:extLst>
             </p:cNvPr>
@@ -29266,7 +29326,7 @@
                   <a16:creationId xmlns:a16="http://schemas.microsoft.com/office/drawing/2014/main" id="{4DD213C5-5C2A-403A-AAEF-E495E64AEB9B}"/>
                 </a:ext>
                 <a:ext uri="{C183D7F6-B498-43B3-948B-1728B52AA6E4}">
-                  <adec:decorative xmlns="" xmlns:adec="http://schemas.microsoft.com/office/drawing/2017/decorative" val="1"/>
+                  <adec:decorative xmlns:adec="http://schemas.microsoft.com/office/drawing/2017/decorative" xmlns="" val="1"/>
                 </a:ext>
               </a:extLst>
             </p:cNvPr>
@@ -29330,7 +29390,7 @@
                   <a16:creationId xmlns:a16="http://schemas.microsoft.com/office/drawing/2014/main" id="{3D07FF46-5E32-4BEE-B85D-107AD341D480}"/>
                 </a:ext>
                 <a:ext uri="{C183D7F6-B498-43B3-948B-1728B52AA6E4}">
-                  <adec:decorative xmlns="" xmlns:adec="http://schemas.microsoft.com/office/drawing/2017/decorative" val="1"/>
+                  <adec:decorative xmlns:adec="http://schemas.microsoft.com/office/drawing/2017/decorative" xmlns="" val="1"/>
                 </a:ext>
               </a:extLst>
             </p:cNvPr>
@@ -29414,7 +29474,7 @@
                   <a16:creationId xmlns:a16="http://schemas.microsoft.com/office/drawing/2014/main" id="{4E5AE900-6815-4A65-9A96-CA280B3A8DF3}"/>
                 </a:ext>
                 <a:ext uri="{C183D7F6-B498-43B3-948B-1728B52AA6E4}">
-                  <adec:decorative xmlns="" xmlns:adec="http://schemas.microsoft.com/office/drawing/2017/decorative" val="1"/>
+                  <adec:decorative xmlns:adec="http://schemas.microsoft.com/office/drawing/2017/decorative" xmlns="" val="1"/>
                 </a:ext>
               </a:extLst>
             </p:cNvPr>
@@ -29493,7 +29553,7 @@
                   <a16:creationId xmlns:a16="http://schemas.microsoft.com/office/drawing/2014/main" id="{45EA57FC-ADA4-45DD-98E7-B0615C5306F6}"/>
                 </a:ext>
                 <a:ext uri="{C183D7F6-B498-43B3-948B-1728B52AA6E4}">
-                  <adec:decorative xmlns="" xmlns:adec="http://schemas.microsoft.com/office/drawing/2017/decorative" val="1"/>
+                  <adec:decorative xmlns:adec="http://schemas.microsoft.com/office/drawing/2017/decorative" xmlns="" val="1"/>
                 </a:ext>
               </a:extLst>
             </p:cNvPr>
@@ -29578,7 +29638,7 @@
                 <a16:creationId xmlns:a16="http://schemas.microsoft.com/office/drawing/2014/main" id="{9FFA7C60-EEB5-45DC-B964-20A76F776EF5}"/>
               </a:ext>
               <a:ext uri="{C183D7F6-B498-43B3-948B-1728B52AA6E4}">
-                <adec:decorative xmlns="" xmlns:adec="http://schemas.microsoft.com/office/drawing/2017/decorative" val="1"/>
+                <adec:decorative xmlns:adec="http://schemas.microsoft.com/office/drawing/2017/decorative" xmlns="" val="1"/>
               </a:ext>
             </a:extLst>
           </p:cNvPr>
@@ -29632,7 +29692,7 @@
                 <a16:creationId xmlns:a16="http://schemas.microsoft.com/office/drawing/2014/main" id="{7D84F46B-82DB-461C-88AC-F6C66B593E2C}"/>
               </a:ext>
               <a:ext uri="{C183D7F6-B498-43B3-948B-1728B52AA6E4}">
-                <adec:decorative xmlns="" xmlns:adec="http://schemas.microsoft.com/office/drawing/2017/decorative" val="1"/>
+                <adec:decorative xmlns:adec="http://schemas.microsoft.com/office/drawing/2017/decorative" xmlns="" val="1"/>
               </a:ext>
             </a:extLst>
           </p:cNvPr>
@@ -29816,7 +29876,7 @@
                 <a16:creationId xmlns:a16="http://schemas.microsoft.com/office/drawing/2014/main" id="{58DF5B7A-7785-49C6-B4EB-252FF28C2132}"/>
               </a:ext>
               <a:ext uri="{C183D7F6-B498-43B3-948B-1728B52AA6E4}">
-                <adec:decorative xmlns="" xmlns:adec="http://schemas.microsoft.com/office/drawing/2017/decorative" val="1"/>
+                <adec:decorative xmlns:adec="http://schemas.microsoft.com/office/drawing/2017/decorative" xmlns="" val="1"/>
               </a:ext>
             </a:extLst>
           </p:cNvPr>
@@ -29847,7 +29907,7 @@
                   <a16:creationId xmlns:a16="http://schemas.microsoft.com/office/drawing/2014/main" id="{78BD0529-90E2-47B4-8D13-CEE11A154183}"/>
                 </a:ext>
                 <a:ext uri="{C183D7F6-B498-43B3-948B-1728B52AA6E4}">
-                  <adec:decorative xmlns="" xmlns:adec="http://schemas.microsoft.com/office/drawing/2017/decorative" val="1"/>
+                  <adec:decorative xmlns:adec="http://schemas.microsoft.com/office/drawing/2017/decorative" xmlns="" val="1"/>
                 </a:ext>
               </a:extLst>
             </p:cNvPr>
@@ -29923,7 +29983,7 @@
                   <a16:creationId xmlns:a16="http://schemas.microsoft.com/office/drawing/2014/main" id="{AE127430-162B-43FD-A02F-6E8AD8FD95EA}"/>
                 </a:ext>
                 <a:ext uri="{C183D7F6-B498-43B3-948B-1728B52AA6E4}">
-                  <adec:decorative xmlns="" xmlns:adec="http://schemas.microsoft.com/office/drawing/2017/decorative" val="1"/>
+                  <adec:decorative xmlns:adec="http://schemas.microsoft.com/office/drawing/2017/decorative" xmlns="" val="1"/>
                 </a:ext>
               </a:extLst>
             </p:cNvPr>
@@ -30004,7 +30064,7 @@
                   <a16:creationId xmlns:a16="http://schemas.microsoft.com/office/drawing/2014/main" id="{7A6023CB-BCF4-4A3C-B04B-EFF677921718}"/>
                 </a:ext>
                 <a:ext uri="{C183D7F6-B498-43B3-948B-1728B52AA6E4}">
-                  <adec:decorative xmlns="" xmlns:adec="http://schemas.microsoft.com/office/drawing/2017/decorative" val="1"/>
+                  <adec:decorative xmlns:adec="http://schemas.microsoft.com/office/drawing/2017/decorative" xmlns="" val="1"/>
                 </a:ext>
               </a:extLst>
             </p:cNvPr>
@@ -30090,7 +30150,7 @@
                   <a16:creationId xmlns:a16="http://schemas.microsoft.com/office/drawing/2014/main" id="{98B0FCF0-0865-45E1-977A-5BFDD0EFCA87}"/>
                 </a:ext>
                 <a:ext uri="{C183D7F6-B498-43B3-948B-1728B52AA6E4}">
-                  <adec:decorative xmlns="" xmlns:adec="http://schemas.microsoft.com/office/drawing/2017/decorative" val="1"/>
+                  <adec:decorative xmlns:adec="http://schemas.microsoft.com/office/drawing/2017/decorative" xmlns="" val="1"/>
                 </a:ext>
               </a:extLst>
             </p:cNvPr>
@@ -30156,7 +30216,7 @@
                   <a16:creationId xmlns:a16="http://schemas.microsoft.com/office/drawing/2014/main" id="{C1FF2792-ADB4-44D2-B7EF-6E3503725DB9}"/>
                 </a:ext>
                 <a:ext uri="{C183D7F6-B498-43B3-948B-1728B52AA6E4}">
-                  <adec:decorative xmlns="" xmlns:adec="http://schemas.microsoft.com/office/drawing/2017/decorative" val="1"/>
+                  <adec:decorative xmlns:adec="http://schemas.microsoft.com/office/drawing/2017/decorative" xmlns="" val="1"/>
                 </a:ext>
               </a:extLst>
             </p:cNvPr>
@@ -30257,7 +30317,7 @@
                   <a16:creationId xmlns:a16="http://schemas.microsoft.com/office/drawing/2014/main" id="{B7B0F0A2-D4CD-4EA5-96E9-9E282F25CD05}"/>
                 </a:ext>
                 <a:ext uri="{C183D7F6-B498-43B3-948B-1728B52AA6E4}">
-                  <adec:decorative xmlns="" xmlns:adec="http://schemas.microsoft.com/office/drawing/2017/decorative" val="1"/>
+                  <adec:decorative xmlns:adec="http://schemas.microsoft.com/office/drawing/2017/decorative" xmlns="" val="1"/>
                 </a:ext>
               </a:extLst>
             </p:cNvPr>
@@ -30353,7 +30413,7 @@
                   <a16:creationId xmlns:a16="http://schemas.microsoft.com/office/drawing/2014/main" id="{FBBC4912-27C6-4C5E-9C40-AE9B6644E54A}"/>
                 </a:ext>
                 <a:ext uri="{C183D7F6-B498-43B3-948B-1728B52AA6E4}">
-                  <adec:decorative xmlns="" xmlns:adec="http://schemas.microsoft.com/office/drawing/2017/decorative" val="1"/>
+                  <adec:decorative xmlns:adec="http://schemas.microsoft.com/office/drawing/2017/decorative" xmlns="" val="1"/>
                 </a:ext>
               </a:extLst>
             </p:cNvPr>
@@ -30429,7 +30489,7 @@
                   <a16:creationId xmlns:a16="http://schemas.microsoft.com/office/drawing/2014/main" id="{127E474D-BE64-49E8-8C82-691642D0BCD1}"/>
                 </a:ext>
                 <a:ext uri="{C183D7F6-B498-43B3-948B-1728B52AA6E4}">
-                  <adec:decorative xmlns="" xmlns:adec="http://schemas.microsoft.com/office/drawing/2017/decorative" val="1"/>
+                  <adec:decorative xmlns:adec="http://schemas.microsoft.com/office/drawing/2017/decorative" xmlns="" val="1"/>
                 </a:ext>
               </a:extLst>
             </p:cNvPr>
@@ -30525,7 +30585,7 @@
                   <a16:creationId xmlns:a16="http://schemas.microsoft.com/office/drawing/2014/main" id="{A385E451-43CB-441B-83EE-28ACB6BCBC89}"/>
                 </a:ext>
                 <a:ext uri="{C183D7F6-B498-43B3-948B-1728B52AA6E4}">
-                  <adec:decorative xmlns="" xmlns:adec="http://schemas.microsoft.com/office/drawing/2017/decorative" val="1"/>
+                  <adec:decorative xmlns:adec="http://schemas.microsoft.com/office/drawing/2017/decorative" xmlns="" val="1"/>
                 </a:ext>
               </a:extLst>
             </p:cNvPr>
@@ -30656,7 +30716,7 @@
                   <a16:creationId xmlns:a16="http://schemas.microsoft.com/office/drawing/2014/main" id="{5BF91B89-051C-49D8-9029-83A1F52B0E38}"/>
                 </a:ext>
                 <a:ext uri="{C183D7F6-B498-43B3-948B-1728B52AA6E4}">
-                  <adec:decorative xmlns="" xmlns:adec="http://schemas.microsoft.com/office/drawing/2017/decorative" val="1"/>
+                  <adec:decorative xmlns:adec="http://schemas.microsoft.com/office/drawing/2017/decorative" xmlns="" val="1"/>
                 </a:ext>
               </a:extLst>
             </p:cNvPr>
@@ -30722,7 +30782,7 @@
                   <a16:creationId xmlns:a16="http://schemas.microsoft.com/office/drawing/2014/main" id="{42329880-D64F-4074-ABE4-348FDC7FB1F4}"/>
                 </a:ext>
                 <a:ext uri="{C183D7F6-B498-43B3-948B-1728B52AA6E4}">
-                  <adec:decorative xmlns="" xmlns:adec="http://schemas.microsoft.com/office/drawing/2017/decorative" val="1"/>
+                  <adec:decorative xmlns:adec="http://schemas.microsoft.com/office/drawing/2017/decorative" xmlns="" val="1"/>
                 </a:ext>
               </a:extLst>
             </p:cNvPr>
@@ -30798,7 +30858,7 @@
                   <a16:creationId xmlns:a16="http://schemas.microsoft.com/office/drawing/2014/main" id="{2FAD4595-5B16-442B-A756-924FB136A5C6}"/>
                 </a:ext>
                 <a:ext uri="{C183D7F6-B498-43B3-948B-1728B52AA6E4}">
-                  <adec:decorative xmlns="" xmlns:adec="http://schemas.microsoft.com/office/drawing/2017/decorative" val="1"/>
+                  <adec:decorative xmlns:adec="http://schemas.microsoft.com/office/drawing/2017/decorative" xmlns="" val="1"/>
                 </a:ext>
               </a:extLst>
             </p:cNvPr>
@@ -30885,7 +30945,7 @@
                 <a16:creationId xmlns:a16="http://schemas.microsoft.com/office/drawing/2014/main" id="{9F9B151E-1B34-4FA6-A53D-B92F787D9EAD}"/>
               </a:ext>
               <a:ext uri="{C183D7F6-B498-43B3-948B-1728B52AA6E4}">
-                <adec:decorative xmlns="" xmlns:adec="http://schemas.microsoft.com/office/drawing/2017/decorative" val="1"/>
+                <adec:decorative xmlns:adec="http://schemas.microsoft.com/office/drawing/2017/decorative" xmlns="" val="1"/>
               </a:ext>
             </a:extLst>
           </p:cNvPr>
@@ -30916,7 +30976,7 @@
                   <a16:creationId xmlns:a16="http://schemas.microsoft.com/office/drawing/2014/main" id="{617ED8F6-0AA2-4080-ADCB-6C7CE17598B9}"/>
                 </a:ext>
                 <a:ext uri="{C183D7F6-B498-43B3-948B-1728B52AA6E4}">
-                  <adec:decorative xmlns="" xmlns:adec="http://schemas.microsoft.com/office/drawing/2017/decorative" val="1"/>
+                  <adec:decorative xmlns:adec="http://schemas.microsoft.com/office/drawing/2017/decorative" xmlns="" val="1"/>
                 </a:ext>
               </a:extLst>
             </p:cNvPr>
@@ -31035,7 +31095,7 @@
                   <a16:creationId xmlns:a16="http://schemas.microsoft.com/office/drawing/2014/main" id="{76F017FD-AF02-4E22-A564-5DCC93F5368C}"/>
                 </a:ext>
                 <a:ext uri="{C183D7F6-B498-43B3-948B-1728B52AA6E4}">
-                  <adec:decorative xmlns="" xmlns:adec="http://schemas.microsoft.com/office/drawing/2017/decorative" val="1"/>
+                  <adec:decorative xmlns:adec="http://schemas.microsoft.com/office/drawing/2017/decorative" xmlns="" val="1"/>
                 </a:ext>
               </a:extLst>
             </p:cNvPr>
@@ -31119,7 +31179,7 @@
                   <a16:creationId xmlns:a16="http://schemas.microsoft.com/office/drawing/2014/main" id="{61F8A187-FAA8-4625-AC70-EE2C7499D5AB}"/>
                 </a:ext>
                 <a:ext uri="{C183D7F6-B498-43B3-948B-1728B52AA6E4}">
-                  <adec:decorative xmlns="" xmlns:adec="http://schemas.microsoft.com/office/drawing/2017/decorative" val="1"/>
+                  <adec:decorative xmlns:adec="http://schemas.microsoft.com/office/drawing/2017/decorative" xmlns="" val="1"/>
                 </a:ext>
               </a:extLst>
             </p:cNvPr>
@@ -31203,7 +31263,7 @@
                   <a16:creationId xmlns:a16="http://schemas.microsoft.com/office/drawing/2014/main" id="{6D431C21-669A-42BC-A2DF-9092CA729B25}"/>
                 </a:ext>
                 <a:ext uri="{C183D7F6-B498-43B3-948B-1728B52AA6E4}">
-                  <adec:decorative xmlns="" xmlns:adec="http://schemas.microsoft.com/office/drawing/2017/decorative" val="1"/>
+                  <adec:decorative xmlns:adec="http://schemas.microsoft.com/office/drawing/2017/decorative" xmlns="" val="1"/>
                 </a:ext>
               </a:extLst>
             </p:cNvPr>
@@ -31302,7 +31362,7 @@
                   <a16:creationId xmlns:a16="http://schemas.microsoft.com/office/drawing/2014/main" id="{D143DDDF-3A80-4C43-BBCF-8EC128010208}"/>
                 </a:ext>
                 <a:ext uri="{C183D7F6-B498-43B3-948B-1728B52AA6E4}">
-                  <adec:decorative xmlns="" xmlns:adec="http://schemas.microsoft.com/office/drawing/2017/decorative" val="1"/>
+                  <adec:decorative xmlns:adec="http://schemas.microsoft.com/office/drawing/2017/decorative" xmlns="" val="1"/>
                 </a:ext>
               </a:extLst>
             </p:cNvPr>
@@ -31411,7 +31471,7 @@
                   <a16:creationId xmlns:a16="http://schemas.microsoft.com/office/drawing/2014/main" id="{313BFF88-4BDD-4CC4-A514-C7D655779147}"/>
                 </a:ext>
                 <a:ext uri="{C183D7F6-B498-43B3-948B-1728B52AA6E4}">
-                  <adec:decorative xmlns="" xmlns:adec="http://schemas.microsoft.com/office/drawing/2017/decorative" val="1"/>
+                  <adec:decorative xmlns:adec="http://schemas.microsoft.com/office/drawing/2017/decorative" xmlns="" val="1"/>
                 </a:ext>
               </a:extLst>
             </p:cNvPr>
@@ -31475,7 +31535,7 @@
                   <a16:creationId xmlns:a16="http://schemas.microsoft.com/office/drawing/2014/main" id="{BA235B4A-F8AD-4C1E-9074-3562538136C5}"/>
                 </a:ext>
                 <a:ext uri="{C183D7F6-B498-43B3-948B-1728B52AA6E4}">
-                  <adec:decorative xmlns="" xmlns:adec="http://schemas.microsoft.com/office/drawing/2017/decorative" val="1"/>
+                  <adec:decorative xmlns:adec="http://schemas.microsoft.com/office/drawing/2017/decorative" xmlns="" val="1"/>
                 </a:ext>
               </a:extLst>
             </p:cNvPr>
@@ -31554,7 +31614,7 @@
                   <a16:creationId xmlns:a16="http://schemas.microsoft.com/office/drawing/2014/main" id="{281D9204-5CB0-44D1-B01F-5FFF6BDB2883}"/>
                 </a:ext>
                 <a:ext uri="{C183D7F6-B498-43B3-948B-1728B52AA6E4}">
-                  <adec:decorative xmlns="" xmlns:adec="http://schemas.microsoft.com/office/drawing/2017/decorative" val="1"/>
+                  <adec:decorative xmlns:adec="http://schemas.microsoft.com/office/drawing/2017/decorative" xmlns="" val="1"/>
                 </a:ext>
               </a:extLst>
             </p:cNvPr>
@@ -31678,7 +31738,7 @@
                   <a16:creationId xmlns:a16="http://schemas.microsoft.com/office/drawing/2014/main" id="{4DD213C5-5C2A-403A-AAEF-E495E64AEB9B}"/>
                 </a:ext>
                 <a:ext uri="{C183D7F6-B498-43B3-948B-1728B52AA6E4}">
-                  <adec:decorative xmlns="" xmlns:adec="http://schemas.microsoft.com/office/drawing/2017/decorative" val="1"/>
+                  <adec:decorative xmlns:adec="http://schemas.microsoft.com/office/drawing/2017/decorative" xmlns="" val="1"/>
                 </a:ext>
               </a:extLst>
             </p:cNvPr>
@@ -31742,7 +31802,7 @@
                   <a16:creationId xmlns:a16="http://schemas.microsoft.com/office/drawing/2014/main" id="{3D07FF46-5E32-4BEE-B85D-107AD341D480}"/>
                 </a:ext>
                 <a:ext uri="{C183D7F6-B498-43B3-948B-1728B52AA6E4}">
-                  <adec:decorative xmlns="" xmlns:adec="http://schemas.microsoft.com/office/drawing/2017/decorative" val="1"/>
+                  <adec:decorative xmlns:adec="http://schemas.microsoft.com/office/drawing/2017/decorative" xmlns="" val="1"/>
                 </a:ext>
               </a:extLst>
             </p:cNvPr>
@@ -31826,7 +31886,7 @@
                   <a16:creationId xmlns:a16="http://schemas.microsoft.com/office/drawing/2014/main" id="{4E5AE900-6815-4A65-9A96-CA280B3A8DF3}"/>
                 </a:ext>
                 <a:ext uri="{C183D7F6-B498-43B3-948B-1728B52AA6E4}">
-                  <adec:decorative xmlns="" xmlns:adec="http://schemas.microsoft.com/office/drawing/2017/decorative" val="1"/>
+                  <adec:decorative xmlns:adec="http://schemas.microsoft.com/office/drawing/2017/decorative" xmlns="" val="1"/>
                 </a:ext>
               </a:extLst>
             </p:cNvPr>
@@ -31905,7 +31965,7 @@
                   <a16:creationId xmlns:a16="http://schemas.microsoft.com/office/drawing/2014/main" id="{45EA57FC-ADA4-45DD-98E7-B0615C5306F6}"/>
                 </a:ext>
                 <a:ext uri="{C183D7F6-B498-43B3-948B-1728B52AA6E4}">
-                  <adec:decorative xmlns="" xmlns:adec="http://schemas.microsoft.com/office/drawing/2017/decorative" val="1"/>
+                  <adec:decorative xmlns:adec="http://schemas.microsoft.com/office/drawing/2017/decorative" xmlns="" val="1"/>
                 </a:ext>
               </a:extLst>
             </p:cNvPr>
@@ -31990,7 +32050,7 @@
                 <a16:creationId xmlns:a16="http://schemas.microsoft.com/office/drawing/2014/main" id="{9FFA7C60-EEB5-45DC-B964-20A76F776EF5}"/>
               </a:ext>
               <a:ext uri="{C183D7F6-B498-43B3-948B-1728B52AA6E4}">
-                <adec:decorative xmlns="" xmlns:adec="http://schemas.microsoft.com/office/drawing/2017/decorative" val="1"/>
+                <adec:decorative xmlns:adec="http://schemas.microsoft.com/office/drawing/2017/decorative" xmlns="" val="1"/>
               </a:ext>
             </a:extLst>
           </p:cNvPr>
@@ -32044,7 +32104,7 @@
                 <a16:creationId xmlns:a16="http://schemas.microsoft.com/office/drawing/2014/main" id="{7D84F46B-82DB-461C-88AC-F6C66B593E2C}"/>
               </a:ext>
               <a:ext uri="{C183D7F6-B498-43B3-948B-1728B52AA6E4}">
-                <adec:decorative xmlns="" xmlns:adec="http://schemas.microsoft.com/office/drawing/2017/decorative" val="1"/>
+                <adec:decorative xmlns:adec="http://schemas.microsoft.com/office/drawing/2017/decorative" xmlns="" val="1"/>
               </a:ext>
             </a:extLst>
           </p:cNvPr>
@@ -32225,7 +32285,7 @@
                 <a16:creationId xmlns:a16="http://schemas.microsoft.com/office/drawing/2014/main" id="{1BB01FB5-37B9-4EBD-AF40-DE68D3CA46A6}"/>
               </a:ext>
               <a:ext uri="{C183D7F6-B498-43B3-948B-1728B52AA6E4}">
-                <adec:decorative xmlns="" xmlns:adec="http://schemas.microsoft.com/office/drawing/2017/decorative" val="1"/>
+                <adec:decorative xmlns:adec="http://schemas.microsoft.com/office/drawing/2017/decorative" xmlns="" val="1"/>
               </a:ext>
             </a:extLst>
           </p:cNvPr>
@@ -32321,7 +32381,7 @@
                 <a16:creationId xmlns:a16="http://schemas.microsoft.com/office/drawing/2014/main" id="{06AF6A9A-0638-4916-AD29-9FC8FC07AE5F}"/>
               </a:ext>
               <a:ext uri="{C183D7F6-B498-43B3-948B-1728B52AA6E4}">
-                <adec:decorative xmlns="" xmlns:adec="http://schemas.microsoft.com/office/drawing/2017/decorative" val="1"/>
+                <adec:decorative xmlns:adec="http://schemas.microsoft.com/office/drawing/2017/decorative" xmlns="" val="1"/>
               </a:ext>
             </a:extLst>
           </p:cNvPr>
@@ -32513,7 +32573,7 @@
                 <a16:creationId xmlns:a16="http://schemas.microsoft.com/office/drawing/2014/main" id="{79057B2B-0D8C-47F2-836B-2E7DD462150A}"/>
               </a:ext>
               <a:ext uri="{C183D7F6-B498-43B3-948B-1728B52AA6E4}">
-                <adec:decorative xmlns="" xmlns:adec="http://schemas.microsoft.com/office/drawing/2017/decorative" val="1"/>
+                <adec:decorative xmlns:adec="http://schemas.microsoft.com/office/drawing/2017/decorative" xmlns="" val="1"/>
               </a:ext>
             </a:extLst>
           </p:cNvPr>

</xml_diff>